<commit_message>
fixed error in ffg graph lesson 13
</commit_message>
<xml_diff>
--- a/lessons/13_dynamic_latent_variable_models/figures/ffg-state-space-with-state-estimation.pptx
+++ b/lessons/13_dynamic_latent_variable_models/figures/ffg-state-space-with-state-estimation.pptx
@@ -3031,8 +3031,8 @@
             </a:p>
           </p:txBody>
         </p:sp>
-        <mc:AlternateContent xmlns:mc="http://schemas.openxmlformats.org/markup-compatibility/2006">
-          <mc:Choice xmlns:a14="http://schemas.microsoft.com/office/drawing/2010/main" Requires="a14">
+        <mc:AlternateContent xmlns:mc="http://schemas.openxmlformats.org/markup-compatibility/2006" xmlns:a14="http://schemas.microsoft.com/office/drawing/2010/main">
+          <mc:Choice Requires="a14">
             <p:sp>
               <p:nvSpPr>
                 <p:cNvPr id="5" name="Rectangle 4"/>
@@ -3112,7 +3112,7 @@
               </p:txBody>
             </p:sp>
           </mc:Choice>
-          <mc:Fallback>
+          <mc:Fallback xmlns="">
             <p:sp>
               <p:nvSpPr>
                 <p:cNvPr id="5" name="Rectangle 4"/>
@@ -3420,8 +3420,8 @@
             </a:fontRef>
           </p:style>
         </p:cxnSp>
-        <mc:AlternateContent xmlns:mc="http://schemas.openxmlformats.org/markup-compatibility/2006">
-          <mc:Choice xmlns:a14="http://schemas.microsoft.com/office/drawing/2010/main" Requires="a14">
+        <mc:AlternateContent xmlns:mc="http://schemas.openxmlformats.org/markup-compatibility/2006" xmlns:a14="http://schemas.microsoft.com/office/drawing/2010/main">
+          <mc:Choice Requires="a14">
             <p:sp>
               <p:nvSpPr>
                 <p:cNvPr id="27" name="Rectangle 26"/>
@@ -3486,7 +3486,7 @@
               </p:txBody>
             </p:sp>
           </mc:Choice>
-          <mc:Fallback>
+          <mc:Fallback xmlns="">
             <p:sp>
               <p:nvSpPr>
                 <p:cNvPr id="27" name="Rectangle 26"/>
@@ -3740,11 +3740,6 @@
                 </a:rPr>
                 <a:t>2</a:t>
               </a:r>
-              <a:endParaRPr lang="en-US" dirty="0">
-                <a:solidFill>
-                  <a:srgbClr val="FF0000"/>
-                </a:solidFill>
-              </a:endParaRPr>
             </a:p>
           </p:txBody>
         </p:sp>
@@ -3778,11 +3773,6 @@
                 </a:rPr>
                 <a:t>3</a:t>
               </a:r>
-              <a:endParaRPr lang="en-US" dirty="0">
-                <a:solidFill>
-                  <a:srgbClr val="FF0000"/>
-                </a:solidFill>
-              </a:endParaRPr>
             </a:p>
           </p:txBody>
         </p:sp>
@@ -3824,8 +3814,8 @@
             </a:p>
           </p:txBody>
         </p:sp>
-        <mc:AlternateContent xmlns:mc="http://schemas.openxmlformats.org/markup-compatibility/2006">
-          <mc:Choice xmlns:a14="http://schemas.microsoft.com/office/drawing/2010/main" Requires="a14">
+        <mc:AlternateContent xmlns:mc="http://schemas.openxmlformats.org/markup-compatibility/2006" xmlns:a14="http://schemas.microsoft.com/office/drawing/2010/main">
+          <mc:Choice Requires="a14">
             <p:sp>
               <p:nvSpPr>
                 <p:cNvPr id="46" name="Rectangle 45"/>
@@ -3936,7 +3926,7 @@
               </p:txBody>
             </p:sp>
           </mc:Choice>
-          <mc:Fallback>
+          <mc:Fallback xmlns="">
             <p:sp>
               <p:nvSpPr>
                 <p:cNvPr id="46" name="Rectangle 45"/>
@@ -3975,8 +3965,8 @@
             </p:sp>
           </mc:Fallback>
         </mc:AlternateContent>
-        <mc:AlternateContent xmlns:mc="http://schemas.openxmlformats.org/markup-compatibility/2006">
-          <mc:Choice xmlns:a14="http://schemas.microsoft.com/office/drawing/2010/main" Requires="a14">
+        <mc:AlternateContent xmlns:mc="http://schemas.openxmlformats.org/markup-compatibility/2006" xmlns:a14="http://schemas.microsoft.com/office/drawing/2010/main">
+          <mc:Choice Requires="a14">
             <p:sp>
               <p:nvSpPr>
                 <p:cNvPr id="47" name="Rectangle 46"/>
@@ -4041,7 +4031,7 @@
               </p:txBody>
             </p:sp>
           </mc:Choice>
-          <mc:Fallback>
+          <mc:Fallback xmlns="">
             <p:sp>
               <p:nvSpPr>
                 <p:cNvPr id="47" name="Rectangle 46"/>
@@ -4194,8 +4184,8 @@
             </a:p>
           </p:txBody>
         </p:sp>
-        <mc:AlternateContent xmlns:mc="http://schemas.openxmlformats.org/markup-compatibility/2006">
-          <mc:Choice xmlns:a14="http://schemas.microsoft.com/office/drawing/2010/main" Requires="a14">
+        <mc:AlternateContent xmlns:mc="http://schemas.openxmlformats.org/markup-compatibility/2006" xmlns:a14="http://schemas.microsoft.com/office/drawing/2010/main">
+          <mc:Choice Requires="a14">
             <p:sp>
               <p:nvSpPr>
                 <p:cNvPr id="54" name="Rectangle 53"/>
@@ -4306,7 +4296,7 @@
               </p:txBody>
             </p:sp>
           </mc:Choice>
-          <mc:Fallback>
+          <mc:Fallback xmlns="">
             <p:sp>
               <p:nvSpPr>
                 <p:cNvPr id="54" name="Rectangle 53"/>
@@ -4625,7 +4615,7 @@
               <p:spPr>
                 <a:xfrm>
                   <a:off x="2737415" y="3003610"/>
-                  <a:ext cx="478528" cy="369332"/>
+                  <a:ext cx="483850" cy="369332"/>
                 </a:xfrm>
                 <a:prstGeom prst="rect">
                   <a:avLst/>
@@ -4668,7 +4658,7 @@
                               <a:rPr lang="en-US" b="0" i="1" smtClean="0">
                                 <a:latin typeface="Cambria Math" charset="0"/>
                               </a:rPr>
-                              <m:t>1</m:t>
+                              <m:t>2</m:t>
                             </m:r>
                           </m:sub>
                         </m:sSub>
@@ -4692,13 +4682,13 @@
               <p:spPr>
                 <a:xfrm>
                   <a:off x="2737415" y="3003610"/>
-                  <a:ext cx="478528" cy="369332"/>
+                  <a:ext cx="483850" cy="369332"/>
                 </a:xfrm>
                 <a:prstGeom prst="rect">
                   <a:avLst/>
                 </a:prstGeom>
                 <a:blipFill rotWithShape="0">
-                  <a:blip r:embed="rId3"/>
+                  <a:blip r:embed="rId7"/>
                   <a:stretch>
                     <a:fillRect/>
                   </a:stretch>
@@ -4934,11 +4924,6 @@
                 </a:rPr>
                 <a:t>6</a:t>
               </a:r>
-              <a:endParaRPr lang="en-US" dirty="0">
-                <a:solidFill>
-                  <a:srgbClr val="FF0000"/>
-                </a:solidFill>
-              </a:endParaRPr>
             </a:p>
           </p:txBody>
         </p:sp>
@@ -5018,8 +5003,8 @@
             </a:p>
           </p:txBody>
         </p:sp>
-        <mc:AlternateContent xmlns:mc="http://schemas.openxmlformats.org/markup-compatibility/2006">
-          <mc:Choice xmlns:a14="http://schemas.microsoft.com/office/drawing/2010/main" Requires="a14">
+        <mc:AlternateContent xmlns:mc="http://schemas.openxmlformats.org/markup-compatibility/2006" xmlns:a14="http://schemas.microsoft.com/office/drawing/2010/main">
+          <mc:Choice Requires="a14">
             <p:sp>
               <p:nvSpPr>
                 <p:cNvPr id="81" name="Rectangle 80"/>
@@ -5130,7 +5115,7 @@
               </p:txBody>
             </p:sp>
           </mc:Choice>
-          <mc:Fallback>
+          <mc:Fallback xmlns="">
             <p:sp>
               <p:nvSpPr>
                 <p:cNvPr id="81" name="Rectangle 80"/>
@@ -5148,7 +5133,7 @@
                   <a:avLst/>
                 </a:prstGeom>
                 <a:blipFill rotWithShape="0">
-                  <a:blip r:embed="rId7"/>
+                  <a:blip r:embed="rId8"/>
                   <a:stretch>
                     <a:fillRect b="-13333"/>
                   </a:stretch>
@@ -5180,7 +5165,7 @@
               <p:spPr>
                 <a:xfrm>
                   <a:off x="2521472" y="1741043"/>
-                  <a:ext cx="469103" cy="369332"/>
+                  <a:ext cx="474424" cy="369332"/>
                 </a:xfrm>
                 <a:prstGeom prst="rect">
                   <a:avLst/>
@@ -5223,7 +5208,7 @@
                               <a:rPr lang="en-US" b="0" i="1" smtClean="0">
                                 <a:latin typeface="Cambria Math" charset="0"/>
                               </a:rPr>
-                              <m:t>1</m:t>
+                              <m:t>2</m:t>
                             </m:r>
                           </m:sub>
                         </m:sSub>
@@ -5247,13 +5232,13 @@
               <p:spPr>
                 <a:xfrm>
                   <a:off x="2521472" y="1741043"/>
-                  <a:ext cx="469103" cy="369332"/>
+                  <a:ext cx="474424" cy="369332"/>
                 </a:xfrm>
                 <a:prstGeom prst="rect">
                   <a:avLst/>
                 </a:prstGeom>
                 <a:blipFill rotWithShape="0">
-                  <a:blip r:embed="rId5"/>
+                  <a:blip r:embed="rId9"/>
                   <a:stretch>
                     <a:fillRect/>
                   </a:stretch>
@@ -5657,8 +5642,8 @@
             </a:fontRef>
           </p:style>
         </p:cxnSp>
-        <mc:AlternateContent xmlns:mc="http://schemas.openxmlformats.org/markup-compatibility/2006">
-          <mc:Choice xmlns:a14="http://schemas.microsoft.com/office/drawing/2010/main" Requires="a14">
+        <mc:AlternateContent xmlns:mc="http://schemas.openxmlformats.org/markup-compatibility/2006" xmlns:a14="http://schemas.microsoft.com/office/drawing/2010/main">
+          <mc:Choice Requires="a14">
             <p:sp>
               <p:nvSpPr>
                 <p:cNvPr id="94" name="Rectangle 93"/>
@@ -5723,7 +5708,7 @@
               </p:txBody>
             </p:sp>
           </mc:Choice>
-          <mc:Fallback>
+          <mc:Fallback xmlns="">
             <p:sp>
               <p:nvSpPr>
                 <p:cNvPr id="94" name="Rectangle 93"/>
@@ -5741,7 +5726,7 @@
                   <a:avLst/>
                 </a:prstGeom>
                 <a:blipFill rotWithShape="0">
-                  <a:blip r:embed="rId8"/>
+                  <a:blip r:embed="rId10"/>
                   <a:stretch>
                     <a:fillRect/>
                   </a:stretch>
@@ -5909,8 +5894,8 @@
             </a:fontRef>
           </p:style>
         </p:cxnSp>
-        <mc:AlternateContent xmlns:mc="http://schemas.openxmlformats.org/markup-compatibility/2006">
-          <mc:Choice xmlns:a14="http://schemas.microsoft.com/office/drawing/2010/main" Requires="a14">
+        <mc:AlternateContent xmlns:mc="http://schemas.openxmlformats.org/markup-compatibility/2006" xmlns:a14="http://schemas.microsoft.com/office/drawing/2010/main">
+          <mc:Choice Requires="a14">
             <p:sp>
               <p:nvSpPr>
                 <p:cNvPr id="103" name="Rectangle 102"/>
@@ -6021,7 +6006,7 @@
               </p:txBody>
             </p:sp>
           </mc:Choice>
-          <mc:Fallback>
+          <mc:Fallback xmlns="">
             <p:sp>
               <p:nvSpPr>
                 <p:cNvPr id="103" name="Rectangle 102"/>
@@ -6039,7 +6024,7 @@
                   <a:avLst/>
                 </a:prstGeom>
                 <a:blipFill rotWithShape="0">
-                  <a:blip r:embed="rId9"/>
+                  <a:blip r:embed="rId11"/>
                   <a:stretch>
                     <a:fillRect b="-13333"/>
                   </a:stretch>
@@ -6060,8 +6045,8 @@
             </p:sp>
           </mc:Fallback>
         </mc:AlternateContent>
-        <mc:AlternateContent xmlns:mc="http://schemas.openxmlformats.org/markup-compatibility/2006">
-          <mc:Choice xmlns:a14="http://schemas.microsoft.com/office/drawing/2010/main" Requires="a14">
+        <mc:AlternateContent xmlns:mc="http://schemas.openxmlformats.org/markup-compatibility/2006" xmlns:a14="http://schemas.microsoft.com/office/drawing/2010/main">
+          <mc:Choice Requires="a14">
             <p:sp>
               <p:nvSpPr>
                 <p:cNvPr id="104" name="Rectangle 103"/>
@@ -6126,7 +6111,7 @@
               </p:txBody>
             </p:sp>
           </mc:Choice>
-          <mc:Fallback>
+          <mc:Fallback xmlns="">
             <p:sp>
               <p:nvSpPr>
                 <p:cNvPr id="104" name="Rectangle 103"/>
@@ -6144,7 +6129,7 @@
                   <a:avLst/>
                 </a:prstGeom>
                 <a:blipFill rotWithShape="0">
-                  <a:blip r:embed="rId10"/>
+                  <a:blip r:embed="rId12"/>
                   <a:stretch>
                     <a:fillRect/>
                   </a:stretch>
@@ -6288,8 +6273,8 @@
           </a:fontRef>
         </p:style>
       </p:cxnSp>
-      <mc:AlternateContent xmlns:mc="http://schemas.openxmlformats.org/markup-compatibility/2006">
-        <mc:Choice xmlns:a14="http://schemas.microsoft.com/office/drawing/2010/main" Requires="a14">
+      <mc:AlternateContent xmlns:mc="http://schemas.openxmlformats.org/markup-compatibility/2006" xmlns:a14="http://schemas.microsoft.com/office/drawing/2010/main">
+        <mc:Choice Requires="a14">
           <p:sp>
             <p:nvSpPr>
               <p:cNvPr id="108" name="Rectangle 107"/>
@@ -6406,7 +6391,7 @@
             </p:txBody>
           </p:sp>
         </mc:Choice>
-        <mc:Fallback>
+        <mc:Fallback xmlns="">
           <p:sp>
             <p:nvSpPr>
               <p:cNvPr id="108" name="Rectangle 107"/>
@@ -6424,7 +6409,7 @@
                 <a:avLst/>
               </a:prstGeom>
               <a:blipFill rotWithShape="0">
-                <a:blip r:embed="rId11"/>
+                <a:blip r:embed="rId13"/>
                 <a:stretch>
                   <a:fillRect b="-13333"/>
                 </a:stretch>

</xml_diff>